<commit_message>
Update github slides & create PDF
</commit_message>
<xml_diff>
--- a/slides-pptx/2b-github.pptx
+++ b/slides-pptx/2b-github.pptx
@@ -5,7 +5,7 @@
     <p:sldMasterId id="2147483648" r:id="rId1"/>
   </p:sldMasterIdLst>
   <p:notesMasterIdLst>
-    <p:notesMasterId r:id="rId14"/>
+    <p:notesMasterId r:id="rId15"/>
   </p:notesMasterIdLst>
   <p:sldIdLst>
     <p:sldId id="256" r:id="rId2"/>
@@ -19,10 +19,11 @@
     <p:sldId id="291" r:id="rId10"/>
     <p:sldId id="293" r:id="rId11"/>
     <p:sldId id="294" r:id="rId12"/>
-    <p:sldId id="287" r:id="rId13"/>
+    <p:sldId id="296" r:id="rId13"/>
+    <p:sldId id="287" r:id="rId14"/>
   </p:sldIdLst>
   <p:sldSz cx="13004800" cy="9753600"/>
-  <p:notesSz cx="6858000" cy="9144000"/>
+  <p:notesSz cx="4279900" cy="5486400"/>
   <p:defaultTextStyle>
     <a:defPPr marL="0" marR="0" indent="0" algn="l" defTabSz="914400" rtl="0" fontAlgn="auto" latinLnBrk="1" hangingPunct="0">
       <a:lnSpc>
@@ -394,15 +395,15 @@
         </p:nvSpPr>
         <p:spPr>
           <a:xfrm>
-            <a:off x="1143000" y="685800"/>
-            <a:ext cx="4572000" cy="3429000"/>
+            <a:off x="768350" y="411163"/>
+            <a:ext cx="2743200" cy="2057400"/>
           </a:xfrm>
           <a:prstGeom prst="rect">
             <a:avLst/>
           </a:prstGeom>
         </p:spPr>
         <p:txBody>
-          <a:bodyPr/>
+          <a:bodyPr lIns="55804" tIns="27902" rIns="55804" bIns="27902"/>
           <a:lstStyle/>
           <a:p>
             <a:endParaRPr/>
@@ -421,15 +422,15 @@
         </p:nvSpPr>
         <p:spPr>
           <a:xfrm>
-            <a:off x="914400" y="4343400"/>
-            <a:ext cx="5029200" cy="4114800"/>
+            <a:off x="570654" y="2606040"/>
+            <a:ext cx="3138593" cy="2468880"/>
           </a:xfrm>
           <a:prstGeom prst="rect">
             <a:avLst/>
           </a:prstGeom>
         </p:spPr>
         <p:txBody>
-          <a:bodyPr/>
+          <a:bodyPr lIns="55804" tIns="27902" rIns="55804" bIns="27902"/>
           <a:lstStyle/>
           <a:p>
             <a:endParaRPr/>
@@ -919,7 +920,7 @@
           </a:ln>
           <a:extLst>
             <a:ext uri="{C572A759-6A51-4108-AA02-DFA0A04FC94B}">
-              <ma14:wrappingTextBoxFlag xmlns:ma14="http://schemas.microsoft.com/office/mac/drawingml/2011/main" xmlns="" val="1"/>
+              <ma14:wrappingTextBoxFlag xmlns="" xmlns:ma14="http://schemas.microsoft.com/office/mac/drawingml/2011/main" val="1"/>
             </a:ext>
           </a:extLst>
         </p:spPr>
@@ -1323,7 +1324,7 @@
           </a:ln>
           <a:extLst>
             <a:ext uri="{C572A759-6A51-4108-AA02-DFA0A04FC94B}">
-              <ma14:wrappingTextBoxFlag xmlns:ma14="http://schemas.microsoft.com/office/mac/drawingml/2011/main" xmlns="" val="1"/>
+              <ma14:wrappingTextBoxFlag xmlns="" xmlns:ma14="http://schemas.microsoft.com/office/mac/drawingml/2011/main" val="1"/>
             </a:ext>
           </a:extLst>
         </p:spPr>
@@ -1386,7 +1387,7 @@
           </a:ln>
           <a:extLst>
             <a:ext uri="{C572A759-6A51-4108-AA02-DFA0A04FC94B}">
-              <ma14:wrappingTextBoxFlag xmlns:ma14="http://schemas.microsoft.com/office/mac/drawingml/2011/main" xmlns="" val="1"/>
+              <ma14:wrappingTextBoxFlag xmlns="" xmlns:ma14="http://schemas.microsoft.com/office/mac/drawingml/2011/main" val="1"/>
             </a:ext>
           </a:extLst>
         </p:spPr>
@@ -2393,7 +2394,7 @@
           </a:ln>
           <a:extLst>
             <a:ext uri="{C572A759-6A51-4108-AA02-DFA0A04FC94B}">
-              <ma14:wrappingTextBoxFlag xmlns:ma14="http://schemas.microsoft.com/office/mac/drawingml/2011/main" xmlns="" val="1"/>
+              <ma14:wrappingTextBoxFlag xmlns="" xmlns:ma14="http://schemas.microsoft.com/office/mac/drawingml/2011/main" val="1"/>
             </a:ext>
           </a:extLst>
         </p:spPr>
@@ -2438,7 +2439,7 @@
           </a:ln>
           <a:extLst>
             <a:ext uri="{C572A759-6A51-4108-AA02-DFA0A04FC94B}">
-              <ma14:wrappingTextBoxFlag xmlns:ma14="http://schemas.microsoft.com/office/mac/drawingml/2011/main" xmlns="" val="1"/>
+              <ma14:wrappingTextBoxFlag xmlns="" xmlns:ma14="http://schemas.microsoft.com/office/mac/drawingml/2011/main" val="1"/>
             </a:ext>
           </a:extLst>
         </p:spPr>
@@ -2479,6 +2480,13 @@
     <a:masterClrMapping/>
   </p:clrMapOvr>
   <p:transition spd="med"/>
+  <p:timing>
+    <p:tnLst>
+      <p:par>
+        <p:cTn id="1" dur="indefinite" restart="never" nodeType="tmRoot"/>
+      </p:par>
+    </p:tnLst>
+  </p:timing>
 </p:sld>
 </file>
 
@@ -2602,11 +2610,19 @@
             </a:r>
             <a:r>
               <a:rPr lang="en-GB" sz="4000" b="1" dirty="0"/>
-              <a:t>pull request</a:t>
+              <a:t>pull </a:t>
+            </a:r>
+            <a:r>
+              <a:rPr lang="en-GB" sz="4000" b="1" dirty="0" smtClean="0"/>
+              <a:t>request (PR)</a:t>
+            </a:r>
+            <a:r>
+              <a:rPr lang="en-GB" sz="4000" dirty="0" smtClean="0"/>
+              <a:t> </a:t>
             </a:r>
             <a:r>
               <a:rPr lang="en-GB" sz="4000" dirty="0"/>
-              <a:t> to propose changes to the original owner.</a:t>
+              <a:t>to propose changes to the original owner.</a:t>
             </a:r>
             <a:endParaRPr lang="en-GB" sz="4000" dirty="0">
               <a:sym typeface="Verlag Condensed"/>
@@ -2625,6 +2641,13 @@
     <a:masterClrMapping/>
   </p:clrMapOvr>
   <p:transition spd="med"/>
+  <p:timing>
+    <p:tnLst>
+      <p:par>
+        <p:cTn id="1" dur="indefinite" restart="never" nodeType="tmRoot"/>
+      </p:par>
+    </p:tnLst>
+  </p:timing>
 </p:sld>
 </file>
 
@@ -2678,77 +2701,112 @@
             <p:ph type="body" idx="1"/>
           </p:nvPr>
         </p:nvSpPr>
-        <p:spPr/>
+        <p:spPr>
+          <a:xfrm>
+            <a:off x="661906" y="1636440"/>
+            <a:ext cx="11680988" cy="7244224"/>
+          </a:xfrm>
+        </p:spPr>
         <p:txBody>
-          <a:bodyPr/>
+          <a:bodyPr>
+            <a:normAutofit fontScale="92500" lnSpcReduction="20000"/>
+          </a:bodyPr>
           <a:lstStyle/>
           <a:p>
             <a:r>
-              <a:rPr lang="en-GB" dirty="0" smtClean="0"/>
-              <a:t>Let’s fork a neighbour’s repo!</a:t>
-            </a:r>
-          </a:p>
-          <a:p>
-            <a:pPr marL="914400" indent="-914400">
+              <a:rPr lang="en-GB" sz="4000" dirty="0" smtClean="0"/>
+              <a:t>Part 1: Create a PR on a partner’s repo</a:t>
+            </a:r>
+          </a:p>
+          <a:p>
+            <a:pPr marL="742950" indent="-742950">
               <a:buFont typeface="+mj-lt"/>
               <a:buAutoNum type="arabicPeriod"/>
             </a:pPr>
             <a:r>
-              <a:rPr lang="en-GB" dirty="0" smtClean="0"/>
-              <a:t>Go to the homepage of a neighbour’s repo on GitHub.</a:t>
-            </a:r>
-          </a:p>
-          <a:p>
-            <a:pPr marL="914400" indent="-914400">
+              <a:rPr lang="en-GB" sz="4000" dirty="0" smtClean="0"/>
+              <a:t>On your partner’s repo on GitHub, click `Fork`.</a:t>
+            </a:r>
+            <a:endParaRPr lang="en-GB" sz="4000" dirty="0"/>
+          </a:p>
+          <a:p>
+            <a:pPr marL="742950" indent="-742950">
               <a:buFont typeface="+mj-lt"/>
               <a:buAutoNum type="arabicPeriod"/>
             </a:pPr>
             <a:r>
-              <a:rPr lang="en-GB" dirty="0" smtClean="0"/>
-              <a:t>Click `Fork` to fork their repo.</a:t>
-            </a:r>
-          </a:p>
-          <a:p>
-            <a:pPr marL="914400" indent="-914400">
+              <a:rPr lang="en-GB" sz="4000" dirty="0" smtClean="0"/>
+              <a:t>In forked repo on GitHub, click `</a:t>
+            </a:r>
+            <a:r>
+              <a:rPr lang="en-GB" sz="4000" dirty="0" err="1" smtClean="0"/>
+              <a:t>branch:master</a:t>
+            </a:r>
+            <a:r>
+              <a:rPr lang="en-GB" sz="4000" dirty="0" smtClean="0"/>
+              <a:t>` to create a new branch: `edit-README`.</a:t>
+            </a:r>
+          </a:p>
+          <a:p>
+            <a:pPr marL="742950" indent="-742950">
               <a:buFont typeface="+mj-lt"/>
               <a:buAutoNum type="arabicPeriod"/>
             </a:pPr>
             <a:r>
-              <a:rPr lang="en-GB" dirty="0"/>
-              <a:t>O</a:t>
-            </a:r>
-            <a:r>
-              <a:rPr lang="en-GB" dirty="0" smtClean="0"/>
-              <a:t>n GitHub add some text to their README – maybe a compliment!</a:t>
-            </a:r>
-          </a:p>
-          <a:p>
-            <a:pPr marL="914400" indent="-914400">
+              <a:rPr lang="en-GB" sz="4000" dirty="0" smtClean="0"/>
+              <a:t>Still on GitHub, edit README and commit your changes to the new branch.</a:t>
+            </a:r>
+          </a:p>
+          <a:p>
+            <a:pPr marL="742950" indent="-742950">
               <a:buFont typeface="+mj-lt"/>
               <a:buAutoNum type="arabicPeriod"/>
             </a:pPr>
             <a:r>
-              <a:rPr lang="en-GB" dirty="0" smtClean="0"/>
-              <a:t>Commit direct to the master branch</a:t>
-            </a:r>
-            <a:br>
-              <a:rPr lang="en-GB" dirty="0" smtClean="0"/>
-            </a:br>
-            <a:r>
-              <a:rPr lang="en-GB" sz="3200" dirty="0" smtClean="0"/>
-              <a:t>(we’ll discuss the other option after </a:t>
-            </a:r>
-            <a:r>
-              <a:rPr lang="en-GB" sz="3200" smtClean="0"/>
-              <a:t>this task)</a:t>
-            </a:r>
-          </a:p>
-          <a:p>
-            <a:pPr marL="914400" indent="-914400">
+              <a:rPr lang="en-GB" sz="4000" dirty="0" smtClean="0"/>
+              <a:t>Click on `Compare &amp; pull request`, check your changes and create a PR.</a:t>
+            </a:r>
+          </a:p>
+          <a:p>
+            <a:pPr marL="742950" indent="-742950">
               <a:buFont typeface="+mj-lt"/>
               <a:buAutoNum type="arabicPeriod"/>
             </a:pPr>
-            <a:endParaRPr lang="en-GB" smtClean="0"/>
+            <a:endParaRPr lang="en-GB" sz="4000" dirty="0" smtClean="0"/>
+          </a:p>
+          <a:p>
+            <a:r>
+              <a:rPr lang="en-GB" sz="4000" dirty="0" smtClean="0"/>
+              <a:t>Part 2: Merge your partner’s PR on your repo</a:t>
+            </a:r>
+          </a:p>
+          <a:p>
+            <a:pPr marL="742950" indent="-742950">
+              <a:buFont typeface="+mj-lt"/>
+              <a:buAutoNum type="arabicPeriod"/>
+            </a:pPr>
+            <a:r>
+              <a:rPr lang="en-GB" sz="4000" dirty="0" smtClean="0"/>
+              <a:t>Go to `Pull requests` tab on your repo, merge PR and delete branch.</a:t>
+            </a:r>
+          </a:p>
+          <a:p>
+            <a:pPr marL="742950" indent="-742950">
+              <a:buFont typeface="+mj-lt"/>
+              <a:buAutoNum type="arabicPeriod"/>
+            </a:pPr>
+            <a:r>
+              <a:rPr lang="en-GB" sz="4000" dirty="0" smtClean="0"/>
+              <a:t>In </a:t>
+            </a:r>
+            <a:r>
+              <a:rPr lang="en-GB" sz="4000" dirty="0" err="1" smtClean="0"/>
+              <a:t>RStudio</a:t>
+            </a:r>
+            <a:r>
+              <a:rPr lang="en-GB" sz="4000" dirty="0" smtClean="0"/>
+              <a:t>, do a git pull and look at git history.</a:t>
+            </a:r>
           </a:p>
         </p:txBody>
       </p:sp>
@@ -2763,10 +2821,199 @@
     <a:masterClrMapping/>
   </p:clrMapOvr>
   <p:transition spd="med"/>
+  <p:timing>
+    <p:tnLst>
+      <p:par>
+        <p:cTn id="1" dur="indefinite" restart="never" nodeType="tmRoot"/>
+      </p:par>
+    </p:tnLst>
+  </p:timing>
 </p:sld>
 </file>
 
 <file path=ppt/slides/slide12.xml><?xml version="1.0" encoding="utf-8"?>
+<p:sld xmlns:a="http://schemas.openxmlformats.org/drawingml/2006/main" xmlns:r="http://schemas.openxmlformats.org/officeDocument/2006/relationships" xmlns:p="http://schemas.openxmlformats.org/presentationml/2006/main">
+  <p:cSld>
+    <p:spTree>
+      <p:nvGrpSpPr>
+        <p:cNvPr id="1" name=""/>
+        <p:cNvGrpSpPr/>
+        <p:nvPr/>
+      </p:nvGrpSpPr>
+      <p:grpSpPr>
+        <a:xfrm>
+          <a:off x="0" y="0"/>
+          <a:ext cx="0" cy="0"/>
+          <a:chOff x="0" y="0"/>
+          <a:chExt cx="0" cy="0"/>
+        </a:xfrm>
+      </p:grpSpPr>
+      <p:sp>
+        <p:nvSpPr>
+          <p:cNvPr id="174" name="Your turn"/>
+          <p:cNvSpPr>
+            <a:spLocks noGrp="1"/>
+          </p:cNvSpPr>
+          <p:nvPr>
+            <p:ph type="title" idx="4294967295"/>
+          </p:nvPr>
+        </p:nvSpPr>
+        <p:spPr>
+          <a:xfrm>
+            <a:off x="0" y="0"/>
+            <a:ext cx="13004800" cy="990600"/>
+          </a:xfrm>
+          <a:prstGeom prst="rect">
+            <a:avLst/>
+          </a:prstGeom>
+        </p:spPr>
+        <p:txBody>
+          <a:bodyPr/>
+          <a:lstStyle/>
+          <a:p>
+            <a:r>
+              <a:rPr lang="en-GB" dirty="0" smtClean="0"/>
+              <a:t>Going Further</a:t>
+            </a:r>
+            <a:endParaRPr dirty="0"/>
+          </a:p>
+        </p:txBody>
+      </p:sp>
+      <p:sp>
+        <p:nvSpPr>
+          <p:cNvPr id="175" name="Follow the instructions in previous slides and make sure that you’re optimally configured.…"/>
+          <p:cNvSpPr>
+            <a:spLocks noGrp="1"/>
+          </p:cNvSpPr>
+          <p:nvPr>
+            <p:ph type="body" idx="4294967295"/>
+          </p:nvPr>
+        </p:nvSpPr>
+        <p:spPr>
+          <a:xfrm>
+            <a:off x="741760" y="2371725"/>
+            <a:ext cx="11680825" cy="6508750"/>
+          </a:xfrm>
+          <a:prstGeom prst="rect">
+            <a:avLst/>
+          </a:prstGeom>
+        </p:spPr>
+        <p:txBody>
+          <a:bodyPr>
+            <a:normAutofit/>
+          </a:bodyPr>
+          <a:lstStyle/>
+          <a:p>
+            <a:pPr hangingPunct="0"/>
+            <a:r>
+              <a:rPr lang="en-GB" sz="4000" dirty="0">
+                <a:sym typeface="Verlag Condensed"/>
+              </a:rPr>
+              <a:t>Charlotte Wickham’s </a:t>
+            </a:r>
+            <a:r>
+              <a:rPr lang="en-GB" sz="4000" dirty="0" smtClean="0">
+                <a:sym typeface="Verlag Condensed"/>
+              </a:rPr>
+              <a:t>Collaborative Coding talk http</a:t>
+            </a:r>
+            <a:r>
+              <a:rPr lang="en-GB" sz="4000" dirty="0">
+                <a:sym typeface="Verlag Condensed"/>
+              </a:rPr>
+              <a:t>://www.cwick.co.nz/talks/collab-code-user17</a:t>
+            </a:r>
+            <a:r>
+              <a:rPr lang="en-GB" sz="4000" dirty="0" smtClean="0">
+                <a:sym typeface="Verlag Condensed"/>
+              </a:rPr>
+              <a:t>/#/</a:t>
+            </a:r>
+          </a:p>
+          <a:p>
+            <a:pPr hangingPunct="0"/>
+            <a:endParaRPr lang="en-GB" sz="4000" dirty="0">
+              <a:sym typeface="Verlag Condensed"/>
+            </a:endParaRPr>
+          </a:p>
+          <a:p>
+            <a:pPr hangingPunct="0"/>
+            <a:r>
+              <a:rPr lang="en-GB" sz="4000" dirty="0">
+                <a:sym typeface="Verlag Condensed"/>
+              </a:rPr>
+              <a:t>Lucy </a:t>
+            </a:r>
+            <a:r>
+              <a:rPr lang="en-GB" sz="4000" dirty="0" err="1">
+                <a:sym typeface="Verlag Condensed"/>
+              </a:rPr>
+              <a:t>D'Agostino</a:t>
+            </a:r>
+            <a:r>
+              <a:rPr lang="en-GB" sz="4000" dirty="0">
+                <a:sym typeface="Verlag Condensed"/>
+              </a:rPr>
+              <a:t> </a:t>
+            </a:r>
+            <a:r>
+              <a:rPr lang="en-GB" sz="4000" dirty="0" smtClean="0">
+                <a:sym typeface="Verlag Condensed"/>
+              </a:rPr>
+              <a:t>McGowan’s Shiny app to find beginner issues on R packages</a:t>
+            </a:r>
+          </a:p>
+          <a:p>
+            <a:pPr hangingPunct="0"/>
+            <a:r>
+              <a:rPr lang="en-GB" sz="4000" dirty="0">
+                <a:sym typeface="Verlag Condensed"/>
+              </a:rPr>
+              <a:t>https://</a:t>
+            </a:r>
+            <a:r>
+              <a:rPr lang="en-GB" sz="4000" dirty="0" smtClean="0">
+                <a:sym typeface="Verlag Condensed"/>
+              </a:rPr>
+              <a:t>github.com/LucyMcGowan/contributr</a:t>
+            </a:r>
+          </a:p>
+          <a:p>
+            <a:pPr hangingPunct="0"/>
+            <a:endParaRPr lang="en-GB" sz="4000" dirty="0" smtClean="0">
+              <a:sym typeface="Verlag Condensed"/>
+            </a:endParaRPr>
+          </a:p>
+          <a:p>
+            <a:pPr hangingPunct="0"/>
+            <a:endParaRPr lang="en-GB" sz="4000" dirty="0">
+              <a:sym typeface="Verlag Condensed"/>
+            </a:endParaRPr>
+          </a:p>
+        </p:txBody>
+      </p:sp>
+    </p:spTree>
+    <p:extLst>
+      <p:ext uri="{BB962C8B-B14F-4D97-AF65-F5344CB8AC3E}">
+        <p14:creationId xmlns:p14="http://schemas.microsoft.com/office/powerpoint/2010/main" val="1917095918"/>
+      </p:ext>
+    </p:extLst>
+  </p:cSld>
+  <p:clrMapOvr>
+    <a:masterClrMapping/>
+  </p:clrMapOvr>
+  <p:transition spd="med"/>
+  <p:timing>
+    <p:tnLst>
+      <p:par>
+        <p:cTn id="1" dur="indefinite" restart="never" nodeType="tmRoot"/>
+      </p:par>
+    </p:tnLst>
+  </p:timing>
+</p:sld>
+</file>
+
+<file path=ppt/slides/slide13.xml><?xml version="1.0" encoding="utf-8"?>
 <p:sld xmlns:a="http://schemas.openxmlformats.org/drawingml/2006/main" xmlns:r="http://schemas.openxmlformats.org/officeDocument/2006/relationships" xmlns:p="http://schemas.openxmlformats.org/presentationml/2006/main">
   <p:cSld>
     <p:spTree>
@@ -2789,6 +3036,13 @@
     <a:masterClrMapping/>
   </p:clrMapOvr>
   <p:transition spd="med"/>
+  <p:timing>
+    <p:tnLst>
+      <p:par>
+        <p:cTn id="1" dur="indefinite" restart="never" nodeType="tmRoot"/>
+      </p:par>
+    </p:tnLst>
+  </p:timing>
 </p:sld>
 </file>
 
@@ -2828,7 +3082,7 @@
           </a:ln>
           <a:extLst>
             <a:ext uri="{C572A759-6A51-4108-AA02-DFA0A04FC94B}">
-              <ma14:wrappingTextBoxFlag xmlns:ma14="http://schemas.microsoft.com/office/mac/drawingml/2011/main" xmlns="" val="1"/>
+              <ma14:wrappingTextBoxFlag xmlns="" xmlns:ma14="http://schemas.microsoft.com/office/mac/drawingml/2011/main" val="1"/>
             </a:ext>
           </a:extLst>
         </p:spPr>
@@ -2895,7 +3149,7 @@
           </a:ln>
           <a:extLst>
             <a:ext uri="{C572A759-6A51-4108-AA02-DFA0A04FC94B}">
-              <ma14:wrappingTextBoxFlag xmlns:ma14="http://schemas.microsoft.com/office/mac/drawingml/2011/main" xmlns="" val="1"/>
+              <ma14:wrappingTextBoxFlag xmlns="" xmlns:ma14="http://schemas.microsoft.com/office/mac/drawingml/2011/main" val="1"/>
             </a:ext>
           </a:extLst>
         </p:spPr>
@@ -2932,6 +3186,13 @@
     <a:masterClrMapping/>
   </p:clrMapOvr>
   <p:transition spd="med"/>
+  <p:timing>
+    <p:tnLst>
+      <p:par>
+        <p:cTn id="1" dur="indefinite" restart="never" nodeType="tmRoot"/>
+      </p:par>
+    </p:tnLst>
+  </p:timing>
 </p:sld>
 </file>
 
@@ -2983,52 +3244,103 @@
       </p:pic>
       <p:sp>
         <p:nvSpPr>
-          <p:cNvPr id="195" name="happygitwithr.com"/>
+          <p:cNvPr id="2" name="TextBox 1"/>
           <p:cNvSpPr txBox="1"/>
           <p:nvPr/>
         </p:nvSpPr>
         <p:spPr>
           <a:xfrm>
-            <a:off x="2081123" y="7464026"/>
-            <a:ext cx="8842554" cy="1318260"/>
+            <a:off x="1533848" y="7674320"/>
+            <a:ext cx="10009112" cy="1533753"/>
           </a:xfrm>
           <a:prstGeom prst="rect">
             <a:avLst/>
           </a:prstGeom>
-          <a:ln w="12700">
+          <a:noFill/>
+          <a:ln w="12700" cap="flat">
+            <a:noFill/>
             <a:miter lim="400000"/>
           </a:ln>
-          <a:extLst>
-            <a:ext uri="{C572A759-6A51-4108-AA02-DFA0A04FC94B}">
-              <ma14:wrappingTextBoxFlag xmlns:ma14="http://schemas.microsoft.com/office/mac/drawingml/2011/main" xmlns="" val="1"/>
-            </a:ext>
-          </a:extLst>
+          <a:effectLst/>
+          <a:sp3d/>
         </p:spPr>
+        <p:style>
+          <a:lnRef idx="0">
+            <a:scrgbClr r="0" g="0" b="0"/>
+          </a:lnRef>
+          <a:fillRef idx="0">
+            <a:scrgbClr r="0" g="0" b="0"/>
+          </a:fillRef>
+          <a:effectRef idx="0">
+            <a:scrgbClr r="0" g="0" b="0"/>
+          </a:effectRef>
+          <a:fontRef idx="none"/>
+        </p:style>
         <p:txBody>
-          <a:bodyPr wrap="none" lIns="50800" tIns="50800" rIns="50800" bIns="50800" anchor="ctr">
+          <a:bodyPr rot="0" spcFirstLastPara="1" vertOverflow="overflow" horzOverflow="overflow" vert="horz" wrap="square" lIns="50800" tIns="50800" rIns="50800" bIns="50800" numCol="1" spcCol="38100" rtlCol="0" anchor="ctr">
             <a:spAutoFit/>
           </a:bodyPr>
-          <a:lstStyle>
-            <a:lvl1pPr algn="ctr">
+          <a:lstStyle/>
+          <a:p>
+            <a:pPr marL="0" marR="0" indent="0" algn="ctr" defTabSz="584200" rtl="0" fontAlgn="auto" latinLnBrk="0" hangingPunct="0">
+              <a:lnSpc>
+                <a:spcPct val="100000"/>
+              </a:lnSpc>
               <a:spcBef>
-                <a:spcPts val="2400"/>
+                <a:spcPts val="600"/>
               </a:spcBef>
-              <a:defRPr sz="9600">
-                <a:latin typeface="Archer-Hairline"/>
-                <a:ea typeface="Archer-Hairline"/>
-                <a:cs typeface="Archer-Hairline"/>
-                <a:sym typeface="Archer-Hairline"/>
-                <a:hlinkClick r:id="rId3"/>
-              </a:defRPr>
-            </a:lvl1pPr>
-          </a:lstStyle>
-          <a:p>
-            <a:r>
-              <a:rPr>
-                <a:hlinkClick r:id="rId3"/>
+              <a:spcAft>
+                <a:spcPts val="0"/>
+              </a:spcAft>
+              <a:buClrTx/>
+              <a:buSzTx/>
+              <a:buFontTx/>
+              <a:buNone/>
+              <a:tabLst/>
+            </a:pPr>
+            <a:r>
+              <a:rPr lang="en-GB" sz="8800" dirty="0"/>
+              <a:t>h</a:t>
+            </a:r>
+            <a:r>
+              <a:rPr kumimoji="0" lang="en-GB" sz="8800" b="0" i="0" u="none" strike="noStrike" cap="none" spc="0" normalizeH="0" baseline="0" dirty="0" smtClean="0">
+                <a:ln>
+                  <a:noFill/>
+                </a:ln>
+                <a:solidFill>
+                  <a:schemeClr val="accent1">
+                    <a:hueOff val="-9935710"/>
+                    <a:satOff val="-80396"/>
+                    <a:lumOff val="-17077"/>
+                  </a:schemeClr>
+                </a:solidFill>
+                <a:effectLst/>
+                <a:uFillTx/>
+                <a:latin typeface="+mn-lt"/>
+                <a:ea typeface="+mn-ea"/>
+                <a:cs typeface="+mn-cs"/>
+                <a:sym typeface="Verlag Condensed"/>
               </a:rPr>
-              <a:t>happygitwithr.com</a:t>
-            </a:r>
+              <a:t>appygitwithr.com</a:t>
+            </a:r>
+            <a:endParaRPr kumimoji="0" lang="en-GB" sz="8800" b="0" i="0" u="none" strike="noStrike" cap="none" spc="0" normalizeH="0" baseline="0" dirty="0">
+              <a:ln>
+                <a:noFill/>
+              </a:ln>
+              <a:solidFill>
+                <a:schemeClr val="accent1">
+                  <a:hueOff val="-9935710"/>
+                  <a:satOff val="-80396"/>
+                  <a:lumOff val="-17077"/>
+                </a:schemeClr>
+              </a:solidFill>
+              <a:effectLst/>
+              <a:uFillTx/>
+              <a:latin typeface="+mn-lt"/>
+              <a:ea typeface="+mn-ea"/>
+              <a:cs typeface="+mn-cs"/>
+              <a:sym typeface="Verlag Condensed"/>
+            </a:endParaRPr>
           </a:p>
         </p:txBody>
       </p:sp>
@@ -3038,6 +3350,13 @@
     <a:masterClrMapping/>
   </p:clrMapOvr>
   <p:transition spd="med"/>
+  <p:timing>
+    <p:tnLst>
+      <p:par>
+        <p:cTn id="1" dur="indefinite" restart="never" nodeType="tmRoot"/>
+      </p:par>
+    </p:tnLst>
+  </p:timing>
 </p:sld>
 </file>
 
@@ -3066,8 +3385,8 @@
         </p:nvSpPr>
         <p:spPr>
           <a:xfrm>
-            <a:off x="149866" y="159044"/>
-            <a:ext cx="12669330" cy="2946401"/>
+            <a:off x="381720" y="380620"/>
+            <a:ext cx="12313367" cy="2503249"/>
           </a:xfrm>
           <a:prstGeom prst="rect">
             <a:avLst/>
@@ -3077,12 +3396,12 @@
           </a:ln>
           <a:extLst>
             <a:ext uri="{C572A759-6A51-4108-AA02-DFA0A04FC94B}">
-              <ma14:wrappingTextBoxFlag xmlns:ma14="http://schemas.microsoft.com/office/mac/drawingml/2011/main" xmlns="" val="1"/>
+              <ma14:wrappingTextBoxFlag xmlns="" xmlns:ma14="http://schemas.microsoft.com/office/mac/drawingml/2011/main" val="1"/>
             </a:ext>
           </a:extLst>
         </p:spPr>
         <p:txBody>
-          <a:bodyPr wrap="none" lIns="50800" tIns="50800" rIns="50800" bIns="50800" anchor="ctr">
+          <a:bodyPr wrap="square" lIns="50800" tIns="50800" rIns="50800" bIns="50800" anchor="ctr">
             <a:spAutoFit/>
           </a:bodyPr>
           <a:lstStyle/>
@@ -3099,7 +3418,7 @@
               </a:defRPr>
             </a:pPr>
             <a:r>
-              <a:rPr dirty="0"/>
+              <a:rPr sz="4800" dirty="0"/>
               <a:t>Excuse me, do you have a moment to talk about version control?</a:t>
             </a:r>
           </a:p>
@@ -3116,11 +3435,12 @@
               </a:defRPr>
             </a:pPr>
             <a:r>
-              <a:rPr dirty="0">
-                <a:hlinkClick r:id="rId2"/>
-              </a:rPr>
+              <a:rPr dirty="0"/>
               <a:t>https://doi.org/10.7287/peerj.preprints.3159v2</a:t>
             </a:r>
+            <a:endParaRPr dirty="0">
+              <a:hlinkClick r:id="rId2"/>
+            </a:endParaRPr>
           </a:p>
         </p:txBody>
       </p:sp>
@@ -3159,6 +3479,13 @@
     <a:masterClrMapping/>
   </p:clrMapOvr>
   <p:transition spd="med"/>
+  <p:timing>
+    <p:tnLst>
+      <p:par>
+        <p:cTn id="1" dur="indefinite" restart="never" nodeType="tmRoot"/>
+      </p:par>
+    </p:tnLst>
+  </p:timing>
 </p:sld>
 </file>
 
@@ -3239,6 +3566,13 @@
     <a:masterClrMapping/>
   </p:clrMapOvr>
   <p:transition spd="med"/>
+  <p:timing>
+    <p:tnLst>
+      <p:par>
+        <p:cTn id="1" dur="indefinite" restart="never" nodeType="tmRoot"/>
+      </p:par>
+    </p:tnLst>
+  </p:timing>
 </p:sld>
 </file>
 
@@ -3414,6 +3748,13 @@
     <a:masterClrMapping/>
   </p:clrMapOvr>
   <p:transition spd="med"/>
+  <p:timing>
+    <p:tnLst>
+      <p:par>
+        <p:cTn id="1" dur="indefinite" restart="never" nodeType="tmRoot"/>
+      </p:par>
+    </p:tnLst>
+  </p:timing>
 </p:sld>
 </file>
 
@@ -3528,7 +3869,15 @@
             </a:pPr>
             <a:r>
               <a:rPr lang="en-GB" sz="4000" dirty="0" smtClean="0"/>
-              <a:t>Click to open README.md, select pencil icon (`Edit this file`) and write a sentence or two.</a:t>
+              <a:t>Click to open README.md, select pencil icon (`Edit this file`) and write a </a:t>
+            </a:r>
+            <a:r>
+              <a:rPr lang="en-GB" sz="4000" dirty="0" smtClean="0"/>
+              <a:t>sentence or </a:t>
+            </a:r>
+            <a:r>
+              <a:rPr lang="en-GB" sz="4000" dirty="0" smtClean="0"/>
+              <a:t>two.</a:t>
             </a:r>
           </a:p>
           <a:p>
@@ -3561,6 +3910,13 @@
     <a:masterClrMapping/>
   </p:clrMapOvr>
   <p:transition spd="med"/>
+  <p:timing>
+    <p:tnLst>
+      <p:par>
+        <p:cTn id="1" dur="indefinite" restart="never" nodeType="tmRoot"/>
+      </p:par>
+    </p:tnLst>
+  </p:timing>
 </p:sld>
 </file>
 
@@ -3769,6 +4125,13 @@
     <a:masterClrMapping/>
   </p:clrMapOvr>
   <p:transition spd="med"/>
+  <p:timing>
+    <p:tnLst>
+      <p:par>
+        <p:cTn id="1" dur="indefinite" restart="never" nodeType="tmRoot"/>
+      </p:par>
+    </p:tnLst>
+  </p:timing>
 </p:sld>
 </file>
 
@@ -3830,13 +4193,17 @@
           </p:nvPr>
         </p:nvSpPr>
         <p:spPr>
+          <a:xfrm>
+            <a:off x="661906" y="1852464"/>
+            <a:ext cx="11680988" cy="7028200"/>
+          </a:xfrm>
           <a:prstGeom prst="rect">
             <a:avLst/>
           </a:prstGeom>
         </p:spPr>
         <p:txBody>
           <a:bodyPr>
-            <a:normAutofit/>
+            <a:normAutofit fontScale="92500" lnSpcReduction="10000"/>
           </a:bodyPr>
           <a:lstStyle/>
           <a:p>
@@ -3891,16 +4258,20 @@
             </a:r>
             <a:r>
               <a:rPr lang="en-GB" sz="4000" dirty="0" smtClean="0"/>
-              <a:t>go to File &gt; New Project… &gt; Version Control &gt; Git</a:t>
-            </a:r>
-            <a:br>
+              <a:t>go to File &gt; New Project… &gt; Version Control &gt; </a:t>
+            </a:r>
+            <a:r>
               <a:rPr lang="en-GB" sz="4000" dirty="0" smtClean="0"/>
-            </a:br>
+              <a:t>Git, paste </a:t>
+            </a:r>
             <a:r>
               <a:rPr lang="en-GB" sz="4000" dirty="0" smtClean="0"/>
-              <a:t> - paste the URL to create the project</a:t>
-            </a:r>
-            <a:endParaRPr lang="en-GB" sz="4000" dirty="0"/>
+              <a:t>the URL to create the </a:t>
+            </a:r>
+            <a:r>
+              <a:rPr lang="en-GB" sz="4000" dirty="0" smtClean="0"/>
+              <a:t>project.</a:t>
+            </a:r>
           </a:p>
           <a:p>
             <a:pPr marL="914400" indent="-914400">
@@ -3909,7 +4280,172 @@
             </a:pPr>
             <a:r>
               <a:rPr lang="en-GB" sz="4000" dirty="0" smtClean="0"/>
-              <a:t>Add a new section to your README, stage, commit and push the change.</a:t>
+              <a:t>Make sure your local git knows who you are</a:t>
+            </a:r>
+            <a:br>
+              <a:rPr lang="en-GB" sz="4000" dirty="0" smtClean="0"/>
+            </a:br>
+            <a:r>
+              <a:rPr lang="en-GB" sz="4000" dirty="0" err="1" smtClean="0"/>
+              <a:t>usethis</a:t>
+            </a:r>
+            <a:r>
+              <a:rPr lang="en-GB" sz="4000" dirty="0" smtClean="0"/>
+              <a:t>::</a:t>
+            </a:r>
+            <a:r>
+              <a:rPr lang="en-GB" sz="4000" dirty="0" err="1" smtClean="0"/>
+              <a:t>use_gitconfig</a:t>
+            </a:r>
+            <a:r>
+              <a:rPr lang="en-GB" sz="4000" dirty="0" smtClean="0"/>
+              <a:t>(</a:t>
+            </a:r>
+            <a:br>
+              <a:rPr lang="en-GB" sz="4000" dirty="0" smtClean="0"/>
+            </a:br>
+            <a:r>
+              <a:rPr lang="en-GB" sz="4000" dirty="0" smtClean="0"/>
+              <a:t>  scope = </a:t>
+            </a:r>
+            <a:r>
+              <a:rPr lang="en-GB" sz="4000" dirty="0"/>
+              <a:t>"</a:t>
+            </a:r>
+            <a:r>
+              <a:rPr lang="en-GB" sz="4000" dirty="0" smtClean="0"/>
+              <a:t>project</a:t>
+            </a:r>
+            <a:r>
+              <a:rPr lang="en-GB" sz="4000" dirty="0"/>
+              <a:t>"</a:t>
+            </a:r>
+            <a:r>
+              <a:rPr lang="en-GB" sz="4000" dirty="0" smtClean="0"/>
+              <a:t>, </a:t>
+            </a:r>
+            <a:r>
+              <a:rPr lang="en-GB" sz="4000" dirty="0" smtClean="0">
+                <a:solidFill>
+                  <a:schemeClr val="accent3">
+                    <a:hueOff val="5855911"/>
+                    <a:satOff val="-72794"/>
+                    <a:lumOff val="7086"/>
+                  </a:schemeClr>
+                </a:solidFill>
+              </a:rPr>
+              <a:t># use </a:t>
+            </a:r>
+            <a:r>
+              <a:rPr lang="en-GB" sz="4000">
+                <a:solidFill>
+                  <a:schemeClr val="accent3">
+                    <a:hueOff val="5855911"/>
+                    <a:satOff val="-72794"/>
+                    <a:lumOff val="7086"/>
+                  </a:schemeClr>
+                </a:solidFill>
+              </a:rPr>
+              <a:t>"</a:t>
+            </a:r>
+            <a:r>
+              <a:rPr lang="en-GB" sz="4000" smtClean="0">
+                <a:solidFill>
+                  <a:schemeClr val="accent3">
+                    <a:hueOff val="5855911"/>
+                    <a:satOff val="-72794"/>
+                    <a:lumOff val="7086"/>
+                  </a:schemeClr>
+                </a:solidFill>
+              </a:rPr>
+              <a:t>user" </a:t>
+            </a:r>
+            <a:r>
+              <a:rPr lang="en-GB" sz="4000" dirty="0">
+                <a:solidFill>
+                  <a:schemeClr val="accent3">
+                    <a:hueOff val="5855911"/>
+                    <a:satOff val="-72794"/>
+                    <a:lumOff val="7086"/>
+                  </a:schemeClr>
+                </a:solidFill>
+              </a:rPr>
+              <a:t>to set globally</a:t>
+            </a:r>
+            <a:r>
+              <a:rPr lang="en-GB" sz="4000" dirty="0" smtClean="0"/>
+              <a:t/>
+            </a:r>
+            <a:br>
+              <a:rPr lang="en-GB" sz="4000" dirty="0" smtClean="0"/>
+            </a:br>
+            <a:r>
+              <a:rPr lang="en-GB" sz="4000" dirty="0" smtClean="0"/>
+              <a:t>  user.name </a:t>
+            </a:r>
+            <a:r>
+              <a:rPr lang="en-GB" sz="4000" dirty="0"/>
+              <a:t>= </a:t>
+            </a:r>
+            <a:r>
+              <a:rPr lang="en-GB" sz="4000" dirty="0"/>
+              <a:t>"Jane Doe"</a:t>
+            </a:r>
+            <a:r>
+              <a:rPr lang="en-GB" sz="4000" dirty="0"/>
+              <a:t>, </a:t>
+            </a:r>
+            <a:r>
+              <a:rPr lang="en-GB" sz="4000" dirty="0" smtClean="0"/>
+              <a:t/>
+            </a:r>
+            <a:br>
+              <a:rPr lang="en-GB" sz="4000" dirty="0" smtClean="0"/>
+            </a:br>
+            <a:r>
+              <a:rPr lang="en-GB" sz="4000" dirty="0" smtClean="0"/>
+              <a:t>  </a:t>
+            </a:r>
+            <a:r>
+              <a:rPr lang="en-GB" sz="4000" dirty="0" err="1" smtClean="0"/>
+              <a:t>user.email</a:t>
+            </a:r>
+            <a:r>
+              <a:rPr lang="en-GB" sz="4000" dirty="0" smtClean="0"/>
+              <a:t> </a:t>
+            </a:r>
+            <a:r>
+              <a:rPr lang="en-GB" sz="4000" dirty="0"/>
+              <a:t>= </a:t>
+            </a:r>
+            <a:r>
+              <a:rPr lang="en-GB" sz="4000" dirty="0" smtClean="0"/>
+              <a:t>jane@example.com</a:t>
+            </a:r>
+            <a:r>
+              <a:rPr lang="en-GB" sz="4000" dirty="0"/>
+              <a:t/>
+            </a:r>
+            <a:br>
+              <a:rPr lang="en-GB" sz="4000" dirty="0"/>
+            </a:br>
+            <a:r>
+              <a:rPr lang="en-GB" sz="4000" dirty="0" smtClean="0"/>
+              <a:t>)</a:t>
+            </a:r>
+          </a:p>
+          <a:p>
+            <a:pPr marL="914400" indent="-914400">
+              <a:buFont typeface="+mj-lt"/>
+              <a:buAutoNum type="arabicPeriod"/>
+            </a:pPr>
+            <a:r>
+              <a:rPr lang="en-GB" sz="4000" dirty="0" smtClean="0"/>
+              <a:t>Add </a:t>
+            </a:r>
+            <a:r>
+              <a:rPr lang="en-GB" sz="4000" dirty="0" smtClean="0"/>
+              <a:t>a new section to your README, stage, commit and push the change.</a:t>
             </a:r>
           </a:p>
         </p:txBody>
@@ -3925,6 +4461,13 @@
     <a:masterClrMapping/>
   </p:clrMapOvr>
   <p:transition spd="med"/>
+  <p:timing>
+    <p:tnLst>
+      <p:par>
+        <p:cTn id="1" dur="indefinite" restart="never" nodeType="tmRoot"/>
+      </p:par>
+    </p:tnLst>
+  </p:timing>
 </p:sld>
 </file>
 

</xml_diff>